<commit_message>
[wip]better public key format (pem)
</commit_message>
<xml_diff>
--- a/暗号通信について.pptx
+++ b/暗号通信について.pptx
@@ -3616,6 +3616,58 @@
       </p:grpSpPr>
       <p:sp>
         <p:nvSpPr>
+          <p:cNvPr id="2" name="正方形/長方形 1">
+            <a:extLst>
+              <a:ext uri="{FF2B5EF4-FFF2-40B4-BE49-F238E27FC236}">
+                <a16:creationId xmlns:a16="http://schemas.microsoft.com/office/drawing/2014/main" id="{FF5EE323-986F-574A-AC18-38EFE87D1CA3}"/>
+              </a:ext>
+            </a:extLst>
+          </p:cNvPr>
+          <p:cNvSpPr/>
+          <p:nvPr/>
+        </p:nvSpPr>
+        <p:spPr>
+          <a:xfrm>
+            <a:off x="0" y="0"/>
+            <a:ext cx="12192000" cy="6858000"/>
+          </a:xfrm>
+          <a:prstGeom prst="rect">
+            <a:avLst/>
+          </a:prstGeom>
+          <a:solidFill>
+            <a:schemeClr val="bg1"/>
+          </a:solidFill>
+          <a:ln>
+            <a:noFill/>
+          </a:ln>
+        </p:spPr>
+        <p:style>
+          <a:lnRef idx="2">
+            <a:schemeClr val="accent1">
+              <a:shade val="15000"/>
+            </a:schemeClr>
+          </a:lnRef>
+          <a:fillRef idx="1">
+            <a:schemeClr val="accent1"/>
+          </a:fillRef>
+          <a:effectRef idx="0">
+            <a:schemeClr val="accent1"/>
+          </a:effectRef>
+          <a:fontRef idx="minor">
+            <a:schemeClr val="lt1"/>
+          </a:fontRef>
+        </p:style>
+        <p:txBody>
+          <a:bodyPr rtlCol="0" anchor="ctr"/>
+          <a:lstStyle/>
+          <a:p>
+            <a:pPr algn="ctr"/>
+            <a:endParaRPr kumimoji="1" lang="ja-JP" altLang="en-US"/>
+          </a:p>
+        </p:txBody>
+      </p:sp>
+      <p:sp>
+        <p:nvSpPr>
           <p:cNvPr id="5" name="テキスト ボックス 4">
             <a:extLst>
               <a:ext uri="{FF2B5EF4-FFF2-40B4-BE49-F238E27FC236}">
@@ -4020,7 +4072,7 @@
         <p:spPr>
           <a:xfrm>
             <a:off x="3090777" y="5498868"/>
-            <a:ext cx="4903907" cy="923330"/>
+            <a:ext cx="5262979" cy="923330"/>
           </a:xfrm>
           <a:prstGeom prst="rect">
             <a:avLst/>
@@ -4065,13 +4117,8 @@
           <a:p>
             <a:r>
               <a:rPr lang="ja-JP" altLang="en-US" dirty="0"/>
-              <a:t>秘密鍵漏洩＝＞ルート証明書</a:t>
-            </a:r>
-            <a:r>
-              <a:rPr lang="en-US" altLang="ja-JP" dirty="0"/>
-              <a:t>…</a:t>
-            </a:r>
-            <a:endParaRPr lang="ja-JP" altLang="en-US" dirty="0"/>
+              <a:t>秘密鍵不正使用防止＝＞信頼できる公開鍵リスト</a:t>
+            </a:r>
           </a:p>
         </p:txBody>
       </p:sp>
@@ -4149,42 +4196,6 @@
           </a:prstGeom>
         </p:spPr>
       </p:pic>
-      <p:sp>
-        <p:nvSpPr>
-          <p:cNvPr id="9" name="テキスト ボックス 8">
-            <a:extLst>
-              <a:ext uri="{FF2B5EF4-FFF2-40B4-BE49-F238E27FC236}">
-                <a16:creationId xmlns:a16="http://schemas.microsoft.com/office/drawing/2014/main" id="{9C8E2969-E86C-DE0F-46B9-3231A2D20E9B}"/>
-              </a:ext>
-            </a:extLst>
-          </p:cNvPr>
-          <p:cNvSpPr txBox="1"/>
-          <p:nvPr/>
-        </p:nvSpPr>
-        <p:spPr>
-          <a:xfrm>
-            <a:off x="126707" y="307607"/>
-            <a:ext cx="3416320" cy="369332"/>
-          </a:xfrm>
-          <a:prstGeom prst="rect">
-            <a:avLst/>
-          </a:prstGeom>
-          <a:noFill/>
-        </p:spPr>
-        <p:txBody>
-          <a:bodyPr wrap="none" rtlCol="0">
-            <a:spAutoFit/>
-          </a:bodyPr>
-          <a:lstStyle/>
-          <a:p>
-            <a:r>
-              <a:rPr lang="ja-JP" altLang="en-US" dirty="0"/>
-              <a:t>特製！なんぼかまし暗号方式！</a:t>
-            </a:r>
-            <a:endParaRPr kumimoji="1" lang="ja-JP" altLang="en-US" dirty="0"/>
-          </a:p>
-        </p:txBody>
-      </p:sp>
       <p:cxnSp>
         <p:nvCxnSpPr>
           <p:cNvPr id="12" name="直線矢印コネクタ 11">
@@ -4201,16 +4212,14 @@
         </p:nvCxnSpPr>
         <p:spPr>
           <a:xfrm flipH="1">
-            <a:off x="2647928" y="861605"/>
+            <a:off x="2647930" y="861603"/>
             <a:ext cx="3639661" cy="1981753"/>
           </a:xfrm>
           <a:prstGeom prst="straightConnector1">
             <a:avLst/>
           </a:prstGeom>
           <a:ln>
-            <a:solidFill>
-              <a:schemeClr val="tx1"/>
-            </a:solidFill>
+            <a:prstDash val="lgDash"/>
             <a:headEnd type="triangle"/>
             <a:tailEnd type="triangle"/>
           </a:ln>

</xml_diff>